<commit_message>
added IIFE to the functions lecture
</commit_message>
<xml_diff>
--- a/JS Fundamentals/7.Functions/JS-Functions.pptx
+++ b/JS Fundamentals/7.Functions/JS-Functions.pptx
@@ -5,10 +5,10 @@
     <p:sldMasterId id="2147484157" r:id="rId1"/>
   </p:sldMasterIdLst>
   <p:notesMasterIdLst>
-    <p:notesMasterId r:id="rId22"/>
+    <p:notesMasterId r:id="rId24"/>
   </p:notesMasterIdLst>
   <p:handoutMasterIdLst>
-    <p:handoutMasterId r:id="rId23"/>
+    <p:handoutMasterId r:id="rId25"/>
   </p:handoutMasterIdLst>
   <p:sldIdLst>
     <p:sldId id="256" r:id="rId2"/>
@@ -29,8 +29,10 @@
     <p:sldId id="288" r:id="rId17"/>
     <p:sldId id="293" r:id="rId18"/>
     <p:sldId id="294" r:id="rId19"/>
-    <p:sldId id="266" r:id="rId20"/>
-    <p:sldId id="278" r:id="rId21"/>
+    <p:sldId id="295" r:id="rId20"/>
+    <p:sldId id="296" r:id="rId21"/>
+    <p:sldId id="266" r:id="rId22"/>
+    <p:sldId id="278" r:id="rId23"/>
   </p:sldIdLst>
   <p:sldSz cx="12192000" cy="6858000"/>
   <p:notesSz cx="6858000" cy="9144000"/>
@@ -144,6 +146,9 @@
         </p15:guide>
       </p15:sldGuideLst>
     </p:ext>
+    <p:ext uri="{2D200454-40CA-4A62-9FC3-DE9A4176ACB9}">
+      <p15:notesGuideLst xmlns:p15="http://schemas.microsoft.com/office/powerpoint/2012/main"/>
+    </p:ext>
   </p:extLst>
 </p:presentation>
 </file>
@@ -230,7 +235,7 @@
           <a:p>
             <a:fld id="{D10AF160-CD5A-4A77-96B0-C85B80371432}" type="datetimeFigureOut">
               <a:rPr lang="en-US" smtClean="0"/>
-              <a:t>25-Apr-16</a:t>
+              <a:t>27-Apr-16</a:t>
             </a:fld>
             <a:endParaRPr lang="en-US"/>
           </a:p>
@@ -395,7 +400,7 @@
           <a:p>
             <a:fld id="{F6A950C5-F15E-44EA-AF6A-22227443235C}" type="datetimeFigureOut">
               <a:rPr lang="en-US" smtClean="0"/>
-              <a:t>25-Apr-16</a:t>
+              <a:t>27-Apr-16</a:t>
             </a:fld>
             <a:endParaRPr lang="en-US"/>
           </a:p>
@@ -1164,7 +1169,7 @@
           <a:p>
             <a:fld id="{6F66794D-9D79-4AC5-96DA-597EA4BF2704}" type="datetimeFigureOut">
               <a:rPr lang="en-US" smtClean="0"/>
-              <a:t>25-Apr-16</a:t>
+              <a:t>27-Apr-16</a:t>
             </a:fld>
             <a:endParaRPr lang="en-US"/>
           </a:p>
@@ -1490,7 +1495,7 @@
           <a:p>
             <a:fld id="{6F66794D-9D79-4AC5-96DA-597EA4BF2704}" type="datetimeFigureOut">
               <a:rPr lang="en-US" smtClean="0"/>
-              <a:t>25-Apr-16</a:t>
+              <a:t>27-Apr-16</a:t>
             </a:fld>
             <a:endParaRPr lang="en-US"/>
           </a:p>
@@ -1738,7 +1743,7 @@
           <a:p>
             <a:fld id="{6F66794D-9D79-4AC5-96DA-597EA4BF2704}" type="datetimeFigureOut">
               <a:rPr lang="en-US" smtClean="0"/>
-              <a:t>25-Apr-16</a:t>
+              <a:t>27-Apr-16</a:t>
             </a:fld>
             <a:endParaRPr lang="en-US"/>
           </a:p>
@@ -2278,7 +2283,7 @@
           <a:p>
             <a:fld id="{6F66794D-9D79-4AC5-96DA-597EA4BF2704}" type="datetimeFigureOut">
               <a:rPr lang="en-US" smtClean="0"/>
-              <a:t>25-Apr-16</a:t>
+              <a:t>27-Apr-16</a:t>
             </a:fld>
             <a:endParaRPr lang="en-US"/>
           </a:p>
@@ -2526,7 +2531,7 @@
           <a:p>
             <a:fld id="{6F66794D-9D79-4AC5-96DA-597EA4BF2704}" type="datetimeFigureOut">
               <a:rPr lang="en-US" smtClean="0"/>
-              <a:t>25-Apr-16</a:t>
+              <a:t>27-Apr-16</a:t>
             </a:fld>
             <a:endParaRPr lang="en-US"/>
           </a:p>
@@ -3058,7 +3063,7 @@
           <a:p>
             <a:fld id="{6F66794D-9D79-4AC5-96DA-597EA4BF2704}" type="datetimeFigureOut">
               <a:rPr lang="en-US" smtClean="0"/>
-              <a:t>25-Apr-16</a:t>
+              <a:t>27-Apr-16</a:t>
             </a:fld>
             <a:endParaRPr lang="en-US"/>
           </a:p>
@@ -3355,7 +3360,7 @@
           <a:p>
             <a:fld id="{6F66794D-9D79-4AC5-96DA-597EA4BF2704}" type="datetimeFigureOut">
               <a:rPr lang="en-US" smtClean="0"/>
-              <a:t>25-Apr-16</a:t>
+              <a:t>27-Apr-16</a:t>
             </a:fld>
             <a:endParaRPr lang="en-US"/>
           </a:p>
@@ -3529,7 +3534,7 @@
           <a:p>
             <a:fld id="{6F66794D-9D79-4AC5-96DA-597EA4BF2704}" type="datetimeFigureOut">
               <a:rPr lang="en-US" smtClean="0"/>
-              <a:t>25-Apr-16</a:t>
+              <a:t>27-Apr-16</a:t>
             </a:fld>
             <a:endParaRPr lang="en-US"/>
           </a:p>
@@ -3709,7 +3714,7 @@
           <a:p>
             <a:fld id="{6F66794D-9D79-4AC5-96DA-597EA4BF2704}" type="datetimeFigureOut">
               <a:rPr lang="en-US" smtClean="0"/>
-              <a:t>25-Apr-16</a:t>
+              <a:t>27-Apr-16</a:t>
             </a:fld>
             <a:endParaRPr lang="en-US"/>
           </a:p>
@@ -3879,7 +3884,7 @@
           <a:p>
             <a:fld id="{6F66794D-9D79-4AC5-96DA-597EA4BF2704}" type="datetimeFigureOut">
               <a:rPr lang="en-US" smtClean="0"/>
-              <a:t>25-Apr-16</a:t>
+              <a:t>27-Apr-16</a:t>
             </a:fld>
             <a:endParaRPr lang="en-US"/>
           </a:p>
@@ -4160,7 +4165,7 @@
           <a:p>
             <a:fld id="{6F66794D-9D79-4AC5-96DA-597EA4BF2704}" type="datetimeFigureOut">
               <a:rPr lang="en-US" smtClean="0"/>
-              <a:t>25-Apr-16</a:t>
+              <a:t>27-Apr-16</a:t>
             </a:fld>
             <a:endParaRPr lang="en-US"/>
           </a:p>
@@ -4457,7 +4462,7 @@
           <a:p>
             <a:fld id="{6F66794D-9D79-4AC5-96DA-597EA4BF2704}" type="datetimeFigureOut">
               <a:rPr lang="en-US" smtClean="0"/>
-              <a:t>25-Apr-16</a:t>
+              <a:t>27-Apr-16</a:t>
             </a:fld>
             <a:endParaRPr lang="en-US"/>
           </a:p>
@@ -4929,7 +4934,7 @@
           <a:p>
             <a:fld id="{6F66794D-9D79-4AC5-96DA-597EA4BF2704}" type="datetimeFigureOut">
               <a:rPr lang="en-US" smtClean="0"/>
-              <a:t>25-Apr-16</a:t>
+              <a:t>27-Apr-16</a:t>
             </a:fld>
             <a:endParaRPr lang="en-US"/>
           </a:p>
@@ -5077,7 +5082,7 @@
           <a:p>
             <a:fld id="{6F66794D-9D79-4AC5-96DA-597EA4BF2704}" type="datetimeFigureOut">
               <a:rPr lang="en-US" smtClean="0"/>
-              <a:t>25-Apr-16</a:t>
+              <a:t>27-Apr-16</a:t>
             </a:fld>
             <a:endParaRPr lang="en-US"/>
           </a:p>
@@ -5172,7 +5177,7 @@
           <a:p>
             <a:fld id="{6F66794D-9D79-4AC5-96DA-597EA4BF2704}" type="datetimeFigureOut">
               <a:rPr lang="en-US" smtClean="0"/>
-              <a:t>25-Apr-16</a:t>
+              <a:t>27-Apr-16</a:t>
             </a:fld>
             <a:endParaRPr lang="en-US"/>
           </a:p>
@@ -5455,7 +5460,7 @@
           <a:p>
             <a:fld id="{6F66794D-9D79-4AC5-96DA-597EA4BF2704}" type="datetimeFigureOut">
               <a:rPr lang="en-US" smtClean="0"/>
-              <a:t>25-Apr-16</a:t>
+              <a:t>27-Apr-16</a:t>
             </a:fld>
             <a:endParaRPr lang="en-US"/>
           </a:p>
@@ -5746,7 +5751,7 @@
           <a:p>
             <a:fld id="{6F66794D-9D79-4AC5-96DA-597EA4BF2704}" type="datetimeFigureOut">
               <a:rPr lang="en-US" smtClean="0"/>
-              <a:t>25-Apr-16</a:t>
+              <a:t>27-Apr-16</a:t>
             </a:fld>
             <a:endParaRPr lang="en-US"/>
           </a:p>
@@ -6276,7 +6281,7 @@
           <a:p>
             <a:fld id="{6F66794D-9D79-4AC5-96DA-597EA4BF2704}" type="datetimeFigureOut">
               <a:rPr lang="en-US" smtClean="0"/>
-              <a:t>25-Apr-16</a:t>
+              <a:t>27-Apr-16</a:t>
             </a:fld>
             <a:endParaRPr lang="en-US"/>
           </a:p>
@@ -9003,24 +9008,7 @@
                 <a:latin typeface="Consolas" pitchFamily="49" charset="0"/>
                 <a:cs typeface="Consolas" pitchFamily="49" charset="0"/>
               </a:rPr>
-              <a:t>function calculateSurface(a = 5, b </a:t>
-            </a:r>
-            <a:r>
-              <a:rPr lang="en-US" b="1" noProof="1">
-                <a:solidFill>
-                  <a:srgbClr val="8CF4F2"/>
-                </a:solidFill>
-                <a:effectLst>
-                  <a:outerShdw blurRad="38100" dist="38100" dir="2700000" algn="tl">
-                    <a:srgbClr val="000000">
-                      <a:alpha val="43137"/>
-                    </a:srgbClr>
-                  </a:outerShdw>
-                </a:effectLst>
-                <a:latin typeface="Consolas" pitchFamily="49" charset="0"/>
-                <a:cs typeface="Consolas" pitchFamily="49" charset="0"/>
-              </a:rPr>
-              <a:t>= </a:t>
+              <a:t>function calculateSurface(a = 5, b = </a:t>
             </a:r>
             <a:r>
               <a:rPr lang="en-US" b="1" noProof="1" smtClean="0">
@@ -9336,20 +9324,6 @@
               </a:rPr>
               <a:t>}</a:t>
             </a:r>
-            <a:endParaRPr lang="en-US" b="1" noProof="1">
-              <a:solidFill>
-                <a:srgbClr val="8CF4F2"/>
-              </a:solidFill>
-              <a:effectLst>
-                <a:outerShdw blurRad="38100" dist="38100" dir="2700000" algn="tl">
-                  <a:srgbClr val="000000">
-                    <a:alpha val="43137"/>
-                  </a:srgbClr>
-                </a:outerShdw>
-              </a:effectLst>
-              <a:latin typeface="Consolas" pitchFamily="49" charset="0"/>
-              <a:cs typeface="Consolas" pitchFamily="49" charset="0"/>
-            </a:endParaRPr>
           </a:p>
         </p:txBody>
       </p:sp>
@@ -9598,24 +9572,7 @@
                 <a:latin typeface="Consolas" pitchFamily="49" charset="0"/>
                 <a:cs typeface="Consolas" pitchFamily="49" charset="0"/>
               </a:rPr>
-              <a:t>var </a:t>
-            </a:r>
-            <a:r>
-              <a:rPr lang="en-US" b="1" noProof="1" smtClean="0">
-                <a:solidFill>
-                  <a:srgbClr val="8CF4F2"/>
-                </a:solidFill>
-                <a:effectLst>
-                  <a:outerShdw blurRad="38100" dist="38100" dir="2700000" algn="tl">
-                    <a:srgbClr val="000000">
-                      <a:alpha val="43137"/>
-                    </a:srgbClr>
-                  </a:outerShdw>
-                </a:effectLst>
-                <a:latin typeface="Consolas" pitchFamily="49" charset="0"/>
-                <a:cs typeface="Consolas" pitchFamily="49" charset="0"/>
-              </a:rPr>
-              <a:t>arr = [1, 2, 3, 4, 5, 6, 7];</a:t>
+              <a:t>var arr = [1, 2, 3, 4, 5, 6, 7];</a:t>
             </a:r>
           </a:p>
           <a:p>
@@ -10032,20 +9989,6 @@
               </a:rPr>
               <a:t>}</a:t>
             </a:r>
-            <a:endParaRPr lang="en-US" b="1" noProof="1" smtClean="0">
-              <a:solidFill>
-                <a:srgbClr val="8CF4F2"/>
-              </a:solidFill>
-              <a:effectLst>
-                <a:outerShdw blurRad="38100" dist="38100" dir="2700000" algn="tl">
-                  <a:srgbClr val="000000">
-                    <a:alpha val="43137"/>
-                  </a:srgbClr>
-                </a:outerShdw>
-              </a:effectLst>
-              <a:latin typeface="Consolas" pitchFamily="49" charset="0"/>
-              <a:cs typeface="Consolas" pitchFamily="49" charset="0"/>
-            </a:endParaRPr>
           </a:p>
         </p:txBody>
       </p:sp>
@@ -10790,20 +10733,6 @@
               </a:rPr>
               <a:t>console.log(outer());</a:t>
             </a:r>
-            <a:endParaRPr lang="en-US" b="1" noProof="1">
-              <a:solidFill>
-                <a:srgbClr val="8CF4F2"/>
-              </a:solidFill>
-              <a:effectLst>
-                <a:outerShdw blurRad="38100" dist="38100" dir="2700000" algn="tl">
-                  <a:srgbClr val="000000">
-                    <a:alpha val="43137"/>
-                  </a:srgbClr>
-                </a:outerShdw>
-              </a:effectLst>
-              <a:latin typeface="Consolas" pitchFamily="49" charset="0"/>
-              <a:cs typeface="Consolas" pitchFamily="49" charset="0"/>
-            </a:endParaRPr>
           </a:p>
         </p:txBody>
       </p:sp>
@@ -11543,6 +11472,573 @@
           <a:chExt cx="0" cy="0"/>
         </a:xfrm>
       </p:grpSpPr>
+      <p:sp>
+        <p:nvSpPr>
+          <p:cNvPr id="3" name="Title 2"/>
+          <p:cNvSpPr>
+            <a:spLocks noGrp="1"/>
+          </p:cNvSpPr>
+          <p:nvPr>
+            <p:ph type="title"/>
+          </p:nvPr>
+        </p:nvSpPr>
+        <p:spPr/>
+        <p:txBody>
+          <a:bodyPr/>
+          <a:lstStyle/>
+          <a:p>
+            <a:r>
+              <a:rPr lang="en-US" dirty="0" smtClean="0"/>
+              <a:t>Immediately invoked function expressions</a:t>
+            </a:r>
+            <a:endParaRPr lang="en-US" dirty="0"/>
+          </a:p>
+        </p:txBody>
+      </p:sp>
+      <p:sp>
+        <p:nvSpPr>
+          <p:cNvPr id="4" name="Content Placeholder 3"/>
+          <p:cNvSpPr>
+            <a:spLocks noGrp="1"/>
+          </p:cNvSpPr>
+          <p:nvPr>
+            <p:ph idx="1"/>
+          </p:nvPr>
+        </p:nvSpPr>
+        <p:spPr>
+          <a:xfrm>
+            <a:off x="1484311" y="2168235"/>
+            <a:ext cx="10018713" cy="3124201"/>
+          </a:xfrm>
+        </p:spPr>
+        <p:txBody>
+          <a:bodyPr/>
+          <a:lstStyle/>
+          <a:p>
+            <a:pPr algn="just"/>
+            <a:r>
+              <a:rPr lang="en-US" dirty="0" smtClean="0"/>
+              <a:t>IIFE </a:t>
+            </a:r>
+            <a:r>
+              <a:rPr lang="bg-BG" dirty="0" smtClean="0"/>
+              <a:t>-&gt; </a:t>
+            </a:r>
+            <a:r>
+              <a:rPr lang="en-US" dirty="0" smtClean="0"/>
+              <a:t>immediately invoked function expression </a:t>
+            </a:r>
+          </a:p>
+          <a:p>
+            <a:pPr algn="just"/>
+            <a:r>
+              <a:rPr lang="bg-BG" dirty="0" smtClean="0"/>
+              <a:t>Фунцкията се изпълнява в момента на своето деклариране</a:t>
+            </a:r>
+          </a:p>
+          <a:p>
+            <a:pPr algn="just"/>
+            <a:r>
+              <a:rPr lang="bg-BG" dirty="0" smtClean="0"/>
+              <a:t>Използват се за създаване на </a:t>
+            </a:r>
+            <a:r>
+              <a:rPr lang="en-US" i="1" dirty="0" smtClean="0">
+                <a:solidFill>
+                  <a:schemeClr val="accent6">
+                    <a:lumMod val="75000"/>
+                  </a:schemeClr>
+                </a:solidFill>
+              </a:rPr>
+              <a:t>scope</a:t>
+            </a:r>
+            <a:r>
+              <a:rPr lang="en-US" dirty="0" smtClean="0"/>
+              <a:t>,</a:t>
+            </a:r>
+            <a:r>
+              <a:rPr lang="bg-BG" dirty="0" smtClean="0"/>
+              <a:t> т.е. да ограничим видимостта на дадени променливи/фунцкии</a:t>
+            </a:r>
+            <a:endParaRPr lang="en-US" dirty="0" smtClean="0"/>
+          </a:p>
+          <a:p>
+            <a:pPr algn="just"/>
+            <a:r>
+              <a:rPr lang="bg-BG" dirty="0" smtClean="0"/>
+              <a:t>Може да бъде дефиниран </a:t>
+            </a:r>
+            <a:r>
+              <a:rPr lang="bg-BG" dirty="0" smtClean="0">
+                <a:hlinkClick r:id="rId2"/>
+              </a:rPr>
+              <a:t>стриктен режим на работа</a:t>
+            </a:r>
+            <a:r>
+              <a:rPr lang="bg-BG" dirty="0" smtClean="0"/>
+              <a:t>, т.е. не се позволява да има деклариране на променливи без </a:t>
+            </a:r>
+            <a:r>
+              <a:rPr lang="en-US" i="1" dirty="0" err="1" smtClean="0">
+                <a:solidFill>
+                  <a:schemeClr val="accent6">
+                    <a:lumMod val="75000"/>
+                  </a:schemeClr>
+                </a:solidFill>
+              </a:rPr>
+              <a:t>var</a:t>
+            </a:r>
+            <a:r>
+              <a:rPr lang="en-US" i="1" dirty="0" smtClean="0">
+                <a:solidFill>
+                  <a:schemeClr val="accent6">
+                    <a:lumMod val="75000"/>
+                  </a:schemeClr>
+                </a:solidFill>
+              </a:rPr>
+              <a:t>/let</a:t>
+            </a:r>
+            <a:endParaRPr lang="en-US" i="1" dirty="0">
+              <a:solidFill>
+                <a:schemeClr val="accent6">
+                  <a:lumMod val="75000"/>
+                </a:schemeClr>
+              </a:solidFill>
+            </a:endParaRPr>
+          </a:p>
+        </p:txBody>
+      </p:sp>
+      <p:sp>
+        <p:nvSpPr>
+          <p:cNvPr id="6" name="Rectangle 5"/>
+          <p:cNvSpPr>
+            <a:spLocks noChangeArrowheads="1"/>
+          </p:cNvSpPr>
+          <p:nvPr/>
+        </p:nvSpPr>
+        <p:spPr bwMode="auto">
+          <a:xfrm>
+            <a:off x="3819739" y="5209554"/>
+            <a:ext cx="5643419" cy="1477328"/>
+          </a:xfrm>
+          <a:prstGeom prst="rect">
+            <a:avLst/>
+          </a:prstGeom>
+          <a:ln/>
+        </p:spPr>
+        <p:style>
+          <a:lnRef idx="0">
+            <a:schemeClr val="accent1"/>
+          </a:lnRef>
+          <a:fillRef idx="3">
+            <a:schemeClr val="accent1"/>
+          </a:fillRef>
+          <a:effectRef idx="3">
+            <a:schemeClr val="accent1"/>
+          </a:effectRef>
+          <a:fontRef idx="minor">
+            <a:schemeClr val="lt1"/>
+          </a:fontRef>
+        </p:style>
+        <p:txBody>
+          <a:bodyPr wrap="square">
+            <a:spAutoFit/>
+          </a:bodyPr>
+          <a:lstStyle/>
+          <a:p>
+            <a:pPr eaLnBrk="0" hangingPunct="0">
+              <a:buClr>
+                <a:schemeClr val="accent5">
+                  <a:lumMod val="40000"/>
+                  <a:lumOff val="60000"/>
+                </a:schemeClr>
+              </a:buClr>
+              <a:buSzPct val="70000"/>
+            </a:pPr>
+            <a:r>
+              <a:rPr lang="en-US" b="1" noProof="1">
+                <a:solidFill>
+                  <a:srgbClr val="8CF4F2"/>
+                </a:solidFill>
+                <a:effectLst>
+                  <a:outerShdw blurRad="38100" dist="38100" dir="2700000" algn="tl">
+                    <a:srgbClr val="000000">
+                      <a:alpha val="43137"/>
+                    </a:srgbClr>
+                  </a:outerShdw>
+                </a:effectLst>
+                <a:latin typeface="Consolas" pitchFamily="49" charset="0"/>
+                <a:cs typeface="Consolas" pitchFamily="49" charset="0"/>
+              </a:rPr>
+              <a:t>(function() {</a:t>
+            </a:r>
+          </a:p>
+          <a:p>
+            <a:pPr eaLnBrk="0" hangingPunct="0">
+              <a:buClr>
+                <a:schemeClr val="accent5">
+                  <a:lumMod val="40000"/>
+                  <a:lumOff val="60000"/>
+                </a:schemeClr>
+              </a:buClr>
+              <a:buSzPct val="70000"/>
+            </a:pPr>
+            <a:r>
+              <a:rPr lang="en-US" b="1" noProof="1">
+                <a:solidFill>
+                  <a:srgbClr val="8CF4F2"/>
+                </a:solidFill>
+                <a:effectLst>
+                  <a:outerShdw blurRad="38100" dist="38100" dir="2700000" algn="tl">
+                    <a:srgbClr val="000000">
+                      <a:alpha val="43137"/>
+                    </a:srgbClr>
+                  </a:outerShdw>
+                </a:effectLst>
+                <a:latin typeface="Consolas" pitchFamily="49" charset="0"/>
+                <a:cs typeface="Consolas" pitchFamily="49" charset="0"/>
+              </a:rPr>
+              <a:t>    "use strict";</a:t>
+            </a:r>
+          </a:p>
+          <a:p>
+            <a:pPr eaLnBrk="0" hangingPunct="0">
+              <a:buClr>
+                <a:schemeClr val="accent5">
+                  <a:lumMod val="40000"/>
+                  <a:lumOff val="60000"/>
+                </a:schemeClr>
+              </a:buClr>
+              <a:buSzPct val="70000"/>
+            </a:pPr>
+            <a:endParaRPr lang="en-US" b="1" noProof="1">
+              <a:solidFill>
+                <a:srgbClr val="8CF4F2"/>
+              </a:solidFill>
+              <a:effectLst>
+                <a:outerShdw blurRad="38100" dist="38100" dir="2700000" algn="tl">
+                  <a:srgbClr val="000000">
+                    <a:alpha val="43137"/>
+                  </a:srgbClr>
+                </a:outerShdw>
+              </a:effectLst>
+              <a:latin typeface="Consolas" pitchFamily="49" charset="0"/>
+              <a:cs typeface="Consolas" pitchFamily="49" charset="0"/>
+            </a:endParaRPr>
+          </a:p>
+          <a:p>
+            <a:pPr eaLnBrk="0" hangingPunct="0">
+              <a:buClr>
+                <a:schemeClr val="accent5">
+                  <a:lumMod val="40000"/>
+                  <a:lumOff val="60000"/>
+                </a:schemeClr>
+              </a:buClr>
+              <a:buSzPct val="70000"/>
+            </a:pPr>
+            <a:r>
+              <a:rPr lang="en-US" b="1" noProof="1">
+                <a:solidFill>
+                  <a:srgbClr val="8CF4F2"/>
+                </a:solidFill>
+                <a:effectLst>
+                  <a:outerShdw blurRad="38100" dist="38100" dir="2700000" algn="tl">
+                    <a:srgbClr val="000000">
+                      <a:alpha val="43137"/>
+                    </a:srgbClr>
+                  </a:outerShdw>
+                </a:effectLst>
+                <a:latin typeface="Consolas" pitchFamily="49" charset="0"/>
+                <a:cs typeface="Consolas" pitchFamily="49" charset="0"/>
+              </a:rPr>
+              <a:t>    console.log("Hello from the IIFE!");</a:t>
+            </a:r>
+          </a:p>
+          <a:p>
+            <a:pPr eaLnBrk="0" hangingPunct="0">
+              <a:buClr>
+                <a:schemeClr val="accent5">
+                  <a:lumMod val="40000"/>
+                  <a:lumOff val="60000"/>
+                </a:schemeClr>
+              </a:buClr>
+              <a:buSzPct val="70000"/>
+            </a:pPr>
+            <a:r>
+              <a:rPr lang="en-US" b="1" noProof="1">
+                <a:solidFill>
+                  <a:srgbClr val="8CF4F2"/>
+                </a:solidFill>
+                <a:effectLst>
+                  <a:outerShdw blurRad="38100" dist="38100" dir="2700000" algn="tl">
+                    <a:srgbClr val="000000">
+                      <a:alpha val="43137"/>
+                    </a:srgbClr>
+                  </a:outerShdw>
+                </a:effectLst>
+                <a:latin typeface="Consolas" pitchFamily="49" charset="0"/>
+                <a:cs typeface="Consolas" pitchFamily="49" charset="0"/>
+              </a:rPr>
+              <a:t>}());</a:t>
+            </a:r>
+            <a:endParaRPr lang="en-US" b="1" noProof="1">
+              <a:solidFill>
+                <a:srgbClr val="8CF4F2"/>
+              </a:solidFill>
+              <a:effectLst>
+                <a:outerShdw blurRad="38100" dist="38100" dir="2700000" algn="tl">
+                  <a:srgbClr val="000000">
+                    <a:alpha val="43137"/>
+                  </a:srgbClr>
+                </a:outerShdw>
+              </a:effectLst>
+              <a:latin typeface="Consolas" pitchFamily="49" charset="0"/>
+              <a:cs typeface="Consolas" pitchFamily="49" charset="0"/>
+            </a:endParaRPr>
+          </a:p>
+        </p:txBody>
+      </p:sp>
+    </p:spTree>
+    <p:extLst>
+      <p:ext uri="{BB962C8B-B14F-4D97-AF65-F5344CB8AC3E}">
+        <p14:creationId xmlns:p14="http://schemas.microsoft.com/office/powerpoint/2010/main" val="2473269506"/>
+      </p:ext>
+    </p:extLst>
+  </p:cSld>
+  <p:clrMapOvr>
+    <a:masterClrMapping/>
+  </p:clrMapOvr>
+</p:sld>
+</file>
+
+<file path=ppt/slides/slide2.xml><?xml version="1.0" encoding="utf-8"?>
+<p:sld xmlns:a="http://schemas.openxmlformats.org/drawingml/2006/main" xmlns:r="http://schemas.openxmlformats.org/officeDocument/2006/relationships" xmlns:p="http://schemas.openxmlformats.org/presentationml/2006/main">
+  <p:cSld>
+    <p:spTree>
+      <p:nvGrpSpPr>
+        <p:cNvPr id="1" name=""/>
+        <p:cNvGrpSpPr/>
+        <p:nvPr/>
+      </p:nvGrpSpPr>
+      <p:grpSpPr>
+        <a:xfrm>
+          <a:off x="0" y="0"/>
+          <a:ext cx="0" cy="0"/>
+          <a:chOff x="0" y="0"/>
+          <a:chExt cx="0" cy="0"/>
+        </a:xfrm>
+      </p:grpSpPr>
+      <p:sp>
+        <p:nvSpPr>
+          <p:cNvPr id="2" name="Title 1"/>
+          <p:cNvSpPr>
+            <a:spLocks noGrp="1"/>
+          </p:cNvSpPr>
+          <p:nvPr>
+            <p:ph type="title"/>
+          </p:nvPr>
+        </p:nvSpPr>
+        <p:spPr/>
+        <p:txBody>
+          <a:bodyPr/>
+          <a:lstStyle/>
+          <a:p>
+            <a:r>
+              <a:rPr lang="bg-BG" dirty="0"/>
+              <a:t>Защо да използваме функции?</a:t>
+            </a:r>
+            <a:endParaRPr lang="en-US" dirty="0"/>
+          </a:p>
+        </p:txBody>
+      </p:sp>
+      <p:sp>
+        <p:nvSpPr>
+          <p:cNvPr id="3" name="Content Placeholder 2"/>
+          <p:cNvSpPr>
+            <a:spLocks noGrp="1"/>
+          </p:cNvSpPr>
+          <p:nvPr>
+            <p:ph idx="1"/>
+          </p:nvPr>
+        </p:nvSpPr>
+        <p:spPr/>
+        <p:txBody>
+          <a:bodyPr/>
+          <a:lstStyle/>
+          <a:p>
+            <a:r>
+              <a:rPr lang="bg-BG" dirty="0"/>
+              <a:t>Разделят кода на малки, </a:t>
+            </a:r>
+            <a:r>
+              <a:rPr lang="bg-BG" dirty="0" err="1"/>
+              <a:t>преизползваеми</a:t>
+            </a:r>
+            <a:r>
+              <a:rPr lang="bg-BG" dirty="0"/>
+              <a:t> парчета код</a:t>
+            </a:r>
+          </a:p>
+          <a:p>
+            <a:r>
+              <a:rPr lang="bg-BG" dirty="0"/>
+              <a:t>Съдържат конкретна логика</a:t>
+            </a:r>
+          </a:p>
+          <a:p>
+            <a:r>
+              <a:rPr lang="bg-BG" dirty="0"/>
+              <a:t>Повишават нивото на абстракция</a:t>
+            </a:r>
+          </a:p>
+          <a:p>
+            <a:r>
+              <a:rPr lang="bg-BG" dirty="0"/>
+              <a:t>Подобряват </a:t>
+            </a:r>
+            <a:r>
+              <a:rPr lang="bg-BG" dirty="0" err="1"/>
+              <a:t>четимостта</a:t>
+            </a:r>
+            <a:r>
+              <a:rPr lang="bg-BG" dirty="0"/>
+              <a:t> на кода</a:t>
+            </a:r>
+          </a:p>
+          <a:p>
+            <a:r>
+              <a:rPr lang="bg-BG" dirty="0"/>
+              <a:t>По-лесна поддръжка на кода в бъдеще</a:t>
+            </a:r>
+            <a:endParaRPr lang="en-US" dirty="0"/>
+          </a:p>
+        </p:txBody>
+      </p:sp>
+    </p:spTree>
+    <p:extLst>
+      <p:ext uri="{BB962C8B-B14F-4D97-AF65-F5344CB8AC3E}">
+        <p14:creationId xmlns:p14="http://schemas.microsoft.com/office/powerpoint/2010/main" val="1881512707"/>
+      </p:ext>
+    </p:extLst>
+  </p:cSld>
+  <p:clrMapOvr>
+    <a:masterClrMapping/>
+  </p:clrMapOvr>
+</p:sld>
+</file>
+
+<file path=ppt/slides/slide20.xml><?xml version="1.0" encoding="utf-8"?>
+<p:sld xmlns:a="http://schemas.openxmlformats.org/drawingml/2006/main" xmlns:r="http://schemas.openxmlformats.org/officeDocument/2006/relationships" xmlns:p="http://schemas.openxmlformats.org/presentationml/2006/main">
+  <p:cSld>
+    <p:spTree>
+      <p:nvGrpSpPr>
+        <p:cNvPr id="1" name=""/>
+        <p:cNvGrpSpPr/>
+        <p:nvPr/>
+      </p:nvGrpSpPr>
+      <p:grpSpPr>
+        <a:xfrm>
+          <a:off x="0" y="0"/>
+          <a:ext cx="0" cy="0"/>
+          <a:chOff x="0" y="0"/>
+          <a:chExt cx="0" cy="0"/>
+        </a:xfrm>
+      </p:grpSpPr>
+      <p:sp>
+        <p:nvSpPr>
+          <p:cNvPr id="6" name="Title 5"/>
+          <p:cNvSpPr>
+            <a:spLocks noGrp="1"/>
+          </p:cNvSpPr>
+          <p:nvPr>
+            <p:ph type="title"/>
+          </p:nvPr>
+        </p:nvSpPr>
+        <p:spPr>
+          <a:xfrm>
+            <a:off x="1484311" y="166256"/>
+            <a:ext cx="10018713" cy="2272144"/>
+          </a:xfrm>
+        </p:spPr>
+        <p:txBody>
+          <a:bodyPr/>
+          <a:lstStyle/>
+          <a:p>
+            <a:r>
+              <a:rPr lang="en-US" dirty="0" smtClean="0"/>
+              <a:t>IIFE</a:t>
+            </a:r>
+            <a:endParaRPr lang="en-US" dirty="0"/>
+          </a:p>
+        </p:txBody>
+      </p:sp>
+      <p:pic>
+        <p:nvPicPr>
+          <p:cNvPr id="7" name="Picture 6"/>
+          <p:cNvPicPr>
+            <a:picLocks noChangeAspect="1"/>
+          </p:cNvPicPr>
+          <p:nvPr/>
+        </p:nvPicPr>
+        <p:blipFill>
+          <a:blip r:embed="rId2">
+            <a:extLst>
+              <a:ext uri="{28A0092B-C50C-407E-A947-70E740481C1C}">
+                <a14:useLocalDpi xmlns:a14="http://schemas.microsoft.com/office/drawing/2010/main" val="0"/>
+              </a:ext>
+            </a:extLst>
+          </a:blip>
+          <a:stretch>
+            <a:fillRect/>
+          </a:stretch>
+        </p:blipFill>
+        <p:spPr>
+          <a:xfrm>
+            <a:off x="4112417" y="1943677"/>
+            <a:ext cx="4762500" cy="4762500"/>
+          </a:xfrm>
+          <a:prstGeom prst="rect">
+            <a:avLst/>
+          </a:prstGeom>
+        </p:spPr>
+      </p:pic>
+    </p:spTree>
+    <p:extLst>
+      <p:ext uri="{BB962C8B-B14F-4D97-AF65-F5344CB8AC3E}">
+        <p14:creationId xmlns:p14="http://schemas.microsoft.com/office/powerpoint/2010/main" val="4280283503"/>
+      </p:ext>
+    </p:extLst>
+  </p:cSld>
+  <p:clrMapOvr>
+    <a:masterClrMapping/>
+  </p:clrMapOvr>
+  <p:timing>
+    <p:tnLst>
+      <p:par>
+        <p:cTn id="1" dur="indefinite" restart="never" nodeType="tmRoot"/>
+      </p:par>
+    </p:tnLst>
+  </p:timing>
+</p:sld>
+</file>
+
+<file path=ppt/slides/slide21.xml><?xml version="1.0" encoding="utf-8"?>
+<p:sld xmlns:a="http://schemas.openxmlformats.org/drawingml/2006/main" xmlns:r="http://schemas.openxmlformats.org/officeDocument/2006/relationships" xmlns:p="http://schemas.openxmlformats.org/presentationml/2006/main">
+  <p:cSld>
+    <p:spTree>
+      <p:nvGrpSpPr>
+        <p:cNvPr id="1" name=""/>
+        <p:cNvGrpSpPr/>
+        <p:nvPr/>
+      </p:nvGrpSpPr>
+      <p:grpSpPr>
+        <a:xfrm>
+          <a:off x="0" y="0"/>
+          <a:ext cx="0" cy="0"/>
+          <a:chOff x="0" y="0"/>
+          <a:chExt cx="0" cy="0"/>
+        </a:xfrm>
+      </p:grpSpPr>
       <p:pic>
         <p:nvPicPr>
           <p:cNvPr id="4" name="Content Placeholder 3"/>
@@ -11592,123 +12088,7 @@
 </p:sld>
 </file>
 
-<file path=ppt/slides/slide2.xml><?xml version="1.0" encoding="utf-8"?>
-<p:sld xmlns:a="http://schemas.openxmlformats.org/drawingml/2006/main" xmlns:r="http://schemas.openxmlformats.org/officeDocument/2006/relationships" xmlns:p="http://schemas.openxmlformats.org/presentationml/2006/main">
-  <p:cSld>
-    <p:spTree>
-      <p:nvGrpSpPr>
-        <p:cNvPr id="1" name=""/>
-        <p:cNvGrpSpPr/>
-        <p:nvPr/>
-      </p:nvGrpSpPr>
-      <p:grpSpPr>
-        <a:xfrm>
-          <a:off x="0" y="0"/>
-          <a:ext cx="0" cy="0"/>
-          <a:chOff x="0" y="0"/>
-          <a:chExt cx="0" cy="0"/>
-        </a:xfrm>
-      </p:grpSpPr>
-      <p:sp>
-        <p:nvSpPr>
-          <p:cNvPr id="2" name="Title 1"/>
-          <p:cNvSpPr>
-            <a:spLocks noGrp="1"/>
-          </p:cNvSpPr>
-          <p:nvPr>
-            <p:ph type="title"/>
-          </p:nvPr>
-        </p:nvSpPr>
-        <p:spPr/>
-        <p:txBody>
-          <a:bodyPr/>
-          <a:lstStyle/>
-          <a:p>
-            <a:r>
-              <a:rPr lang="bg-BG" dirty="0"/>
-              <a:t>Защо да използваме функции?</a:t>
-            </a:r>
-            <a:endParaRPr lang="en-US" dirty="0"/>
-          </a:p>
-        </p:txBody>
-      </p:sp>
-      <p:sp>
-        <p:nvSpPr>
-          <p:cNvPr id="3" name="Content Placeholder 2"/>
-          <p:cNvSpPr>
-            <a:spLocks noGrp="1"/>
-          </p:cNvSpPr>
-          <p:nvPr>
-            <p:ph idx="1"/>
-          </p:nvPr>
-        </p:nvSpPr>
-        <p:spPr/>
-        <p:txBody>
-          <a:bodyPr/>
-          <a:lstStyle/>
-          <a:p>
-            <a:r>
-              <a:rPr lang="bg-BG" dirty="0"/>
-              <a:t>Разделят кода на малки, </a:t>
-            </a:r>
-            <a:r>
-              <a:rPr lang="bg-BG" dirty="0" err="1"/>
-              <a:t>преизползваеми</a:t>
-            </a:r>
-            <a:r>
-              <a:rPr lang="bg-BG" dirty="0"/>
-              <a:t> парчета код</a:t>
-            </a:r>
-          </a:p>
-          <a:p>
-            <a:r>
-              <a:rPr lang="bg-BG" dirty="0"/>
-              <a:t>Съдържат конкретна логика</a:t>
-            </a:r>
-          </a:p>
-          <a:p>
-            <a:r>
-              <a:rPr lang="bg-BG" dirty="0"/>
-              <a:t>Повишават нивото на абстракция</a:t>
-            </a:r>
-          </a:p>
-          <a:p>
-            <a:r>
-              <a:rPr lang="bg-BG" dirty="0"/>
-              <a:t>Подобряват </a:t>
-            </a:r>
-            <a:r>
-              <a:rPr lang="bg-BG" dirty="0" err="1"/>
-              <a:t>четимостта</a:t>
-            </a:r>
-            <a:r>
-              <a:rPr lang="bg-BG" dirty="0"/>
-              <a:t> на кода</a:t>
-            </a:r>
-          </a:p>
-          <a:p>
-            <a:r>
-              <a:rPr lang="bg-BG" dirty="0"/>
-              <a:t>По-лесна поддръжка на кода в бъдеще</a:t>
-            </a:r>
-            <a:endParaRPr lang="en-US" dirty="0"/>
-          </a:p>
-        </p:txBody>
-      </p:sp>
-    </p:spTree>
-    <p:extLst>
-      <p:ext uri="{BB962C8B-B14F-4D97-AF65-F5344CB8AC3E}">
-        <p14:creationId xmlns:p14="http://schemas.microsoft.com/office/powerpoint/2010/main" val="1881512707"/>
-      </p:ext>
-    </p:extLst>
-  </p:cSld>
-  <p:clrMapOvr>
-    <a:masterClrMapping/>
-  </p:clrMapOvr>
-</p:sld>
-</file>
-
-<file path=ppt/slides/slide20.xml><?xml version="1.0" encoding="utf-8"?>
+<file path=ppt/slides/slide22.xml><?xml version="1.0" encoding="utf-8"?>
 <p:sld xmlns:a="http://schemas.openxmlformats.org/drawingml/2006/main" xmlns:r="http://schemas.openxmlformats.org/officeDocument/2006/relationships" xmlns:p="http://schemas.openxmlformats.org/presentationml/2006/main">
   <p:cSld>
     <p:spTree>

</xml_diff>

<commit_message>
added recursion to the functions lecture
</commit_message>
<xml_diff>
--- a/JS Fundamentals/7.Functions/JS-Functions.pptx
+++ b/JS Fundamentals/7.Functions/JS-Functions.pptx
@@ -5,10 +5,10 @@
     <p:sldMasterId id="2147484157" r:id="rId1"/>
   </p:sldMasterIdLst>
   <p:notesMasterIdLst>
-    <p:notesMasterId r:id="rId24"/>
+    <p:notesMasterId r:id="rId26"/>
   </p:notesMasterIdLst>
   <p:handoutMasterIdLst>
-    <p:handoutMasterId r:id="rId25"/>
+    <p:handoutMasterId r:id="rId27"/>
   </p:handoutMasterIdLst>
   <p:sldIdLst>
     <p:sldId id="256" r:id="rId2"/>
@@ -31,8 +31,10 @@
     <p:sldId id="294" r:id="rId19"/>
     <p:sldId id="295" r:id="rId20"/>
     <p:sldId id="296" r:id="rId21"/>
-    <p:sldId id="266" r:id="rId22"/>
-    <p:sldId id="278" r:id="rId23"/>
+    <p:sldId id="297" r:id="rId22"/>
+    <p:sldId id="298" r:id="rId23"/>
+    <p:sldId id="266" r:id="rId24"/>
+    <p:sldId id="278" r:id="rId25"/>
   </p:sldIdLst>
   <p:sldSz cx="12192000" cy="6858000"/>
   <p:notesSz cx="6858000" cy="9144000"/>
@@ -235,7 +237,7 @@
           <a:p>
             <a:fld id="{D10AF160-CD5A-4A77-96B0-C85B80371432}" type="datetimeFigureOut">
               <a:rPr lang="en-US" smtClean="0"/>
-              <a:t>27-Apr-16</a:t>
+              <a:t>28-Apr-16</a:t>
             </a:fld>
             <a:endParaRPr lang="en-US"/>
           </a:p>
@@ -400,7 +402,7 @@
           <a:p>
             <a:fld id="{F6A950C5-F15E-44EA-AF6A-22227443235C}" type="datetimeFigureOut">
               <a:rPr lang="en-US" smtClean="0"/>
-              <a:t>27-Apr-16</a:t>
+              <a:t>28-Apr-16</a:t>
             </a:fld>
             <a:endParaRPr lang="en-US"/>
           </a:p>
@@ -1169,7 +1171,7 @@
           <a:p>
             <a:fld id="{6F66794D-9D79-4AC5-96DA-597EA4BF2704}" type="datetimeFigureOut">
               <a:rPr lang="en-US" smtClean="0"/>
-              <a:t>27-Apr-16</a:t>
+              <a:t>28-Apr-16</a:t>
             </a:fld>
             <a:endParaRPr lang="en-US"/>
           </a:p>
@@ -1495,7 +1497,7 @@
           <a:p>
             <a:fld id="{6F66794D-9D79-4AC5-96DA-597EA4BF2704}" type="datetimeFigureOut">
               <a:rPr lang="en-US" smtClean="0"/>
-              <a:t>27-Apr-16</a:t>
+              <a:t>28-Apr-16</a:t>
             </a:fld>
             <a:endParaRPr lang="en-US"/>
           </a:p>
@@ -1743,7 +1745,7 @@
           <a:p>
             <a:fld id="{6F66794D-9D79-4AC5-96DA-597EA4BF2704}" type="datetimeFigureOut">
               <a:rPr lang="en-US" smtClean="0"/>
-              <a:t>27-Apr-16</a:t>
+              <a:t>28-Apr-16</a:t>
             </a:fld>
             <a:endParaRPr lang="en-US"/>
           </a:p>
@@ -2283,7 +2285,7 @@
           <a:p>
             <a:fld id="{6F66794D-9D79-4AC5-96DA-597EA4BF2704}" type="datetimeFigureOut">
               <a:rPr lang="en-US" smtClean="0"/>
-              <a:t>27-Apr-16</a:t>
+              <a:t>28-Apr-16</a:t>
             </a:fld>
             <a:endParaRPr lang="en-US"/>
           </a:p>
@@ -2531,7 +2533,7 @@
           <a:p>
             <a:fld id="{6F66794D-9D79-4AC5-96DA-597EA4BF2704}" type="datetimeFigureOut">
               <a:rPr lang="en-US" smtClean="0"/>
-              <a:t>27-Apr-16</a:t>
+              <a:t>28-Apr-16</a:t>
             </a:fld>
             <a:endParaRPr lang="en-US"/>
           </a:p>
@@ -3063,7 +3065,7 @@
           <a:p>
             <a:fld id="{6F66794D-9D79-4AC5-96DA-597EA4BF2704}" type="datetimeFigureOut">
               <a:rPr lang="en-US" smtClean="0"/>
-              <a:t>27-Apr-16</a:t>
+              <a:t>28-Apr-16</a:t>
             </a:fld>
             <a:endParaRPr lang="en-US"/>
           </a:p>
@@ -3360,7 +3362,7 @@
           <a:p>
             <a:fld id="{6F66794D-9D79-4AC5-96DA-597EA4BF2704}" type="datetimeFigureOut">
               <a:rPr lang="en-US" smtClean="0"/>
-              <a:t>27-Apr-16</a:t>
+              <a:t>28-Apr-16</a:t>
             </a:fld>
             <a:endParaRPr lang="en-US"/>
           </a:p>
@@ -3534,7 +3536,7 @@
           <a:p>
             <a:fld id="{6F66794D-9D79-4AC5-96DA-597EA4BF2704}" type="datetimeFigureOut">
               <a:rPr lang="en-US" smtClean="0"/>
-              <a:t>27-Apr-16</a:t>
+              <a:t>28-Apr-16</a:t>
             </a:fld>
             <a:endParaRPr lang="en-US"/>
           </a:p>
@@ -3714,7 +3716,7 @@
           <a:p>
             <a:fld id="{6F66794D-9D79-4AC5-96DA-597EA4BF2704}" type="datetimeFigureOut">
               <a:rPr lang="en-US" smtClean="0"/>
-              <a:t>27-Apr-16</a:t>
+              <a:t>28-Apr-16</a:t>
             </a:fld>
             <a:endParaRPr lang="en-US"/>
           </a:p>
@@ -3884,7 +3886,7 @@
           <a:p>
             <a:fld id="{6F66794D-9D79-4AC5-96DA-597EA4BF2704}" type="datetimeFigureOut">
               <a:rPr lang="en-US" smtClean="0"/>
-              <a:t>27-Apr-16</a:t>
+              <a:t>28-Apr-16</a:t>
             </a:fld>
             <a:endParaRPr lang="en-US"/>
           </a:p>
@@ -4165,7 +4167,7 @@
           <a:p>
             <a:fld id="{6F66794D-9D79-4AC5-96DA-597EA4BF2704}" type="datetimeFigureOut">
               <a:rPr lang="en-US" smtClean="0"/>
-              <a:t>27-Apr-16</a:t>
+              <a:t>28-Apr-16</a:t>
             </a:fld>
             <a:endParaRPr lang="en-US"/>
           </a:p>
@@ -4462,7 +4464,7 @@
           <a:p>
             <a:fld id="{6F66794D-9D79-4AC5-96DA-597EA4BF2704}" type="datetimeFigureOut">
               <a:rPr lang="en-US" smtClean="0"/>
-              <a:t>27-Apr-16</a:t>
+              <a:t>28-Apr-16</a:t>
             </a:fld>
             <a:endParaRPr lang="en-US"/>
           </a:p>
@@ -4934,7 +4936,7 @@
           <a:p>
             <a:fld id="{6F66794D-9D79-4AC5-96DA-597EA4BF2704}" type="datetimeFigureOut">
               <a:rPr lang="en-US" smtClean="0"/>
-              <a:t>27-Apr-16</a:t>
+              <a:t>28-Apr-16</a:t>
             </a:fld>
             <a:endParaRPr lang="en-US"/>
           </a:p>
@@ -5082,7 +5084,7 @@
           <a:p>
             <a:fld id="{6F66794D-9D79-4AC5-96DA-597EA4BF2704}" type="datetimeFigureOut">
               <a:rPr lang="en-US" smtClean="0"/>
-              <a:t>27-Apr-16</a:t>
+              <a:t>28-Apr-16</a:t>
             </a:fld>
             <a:endParaRPr lang="en-US"/>
           </a:p>
@@ -5177,7 +5179,7 @@
           <a:p>
             <a:fld id="{6F66794D-9D79-4AC5-96DA-597EA4BF2704}" type="datetimeFigureOut">
               <a:rPr lang="en-US" smtClean="0"/>
-              <a:t>27-Apr-16</a:t>
+              <a:t>28-Apr-16</a:t>
             </a:fld>
             <a:endParaRPr lang="en-US"/>
           </a:p>
@@ -5460,7 +5462,7 @@
           <a:p>
             <a:fld id="{6F66794D-9D79-4AC5-96DA-597EA4BF2704}" type="datetimeFigureOut">
               <a:rPr lang="en-US" smtClean="0"/>
-              <a:t>27-Apr-16</a:t>
+              <a:t>28-Apr-16</a:t>
             </a:fld>
             <a:endParaRPr lang="en-US"/>
           </a:p>
@@ -5751,7 +5753,7 @@
           <a:p>
             <a:fld id="{6F66794D-9D79-4AC5-96DA-597EA4BF2704}" type="datetimeFigureOut">
               <a:rPr lang="en-US" smtClean="0"/>
-              <a:t>27-Apr-16</a:t>
+              <a:t>28-Apr-16</a:t>
             </a:fld>
             <a:endParaRPr lang="en-US"/>
           </a:p>
@@ -6281,7 +6283,7 @@
           <a:p>
             <a:fld id="{6F66794D-9D79-4AC5-96DA-597EA4BF2704}" type="datetimeFigureOut">
               <a:rPr lang="en-US" smtClean="0"/>
-              <a:t>27-Apr-16</a:t>
+              <a:t>28-Apr-16</a:t>
             </a:fld>
             <a:endParaRPr lang="en-US"/>
           </a:p>
@@ -11781,20 +11783,6 @@
               </a:rPr>
               <a:t>}());</a:t>
             </a:r>
-            <a:endParaRPr lang="en-US" b="1" noProof="1">
-              <a:solidFill>
-                <a:srgbClr val="8CF4F2"/>
-              </a:solidFill>
-              <a:effectLst>
-                <a:outerShdw blurRad="38100" dist="38100" dir="2700000" algn="tl">
-                  <a:srgbClr val="000000">
-                    <a:alpha val="43137"/>
-                  </a:srgbClr>
-                </a:outerShdw>
-              </a:effectLst>
-              <a:latin typeface="Consolas" pitchFamily="49" charset="0"/>
-              <a:cs typeface="Consolas" pitchFamily="49" charset="0"/>
-            </a:endParaRPr>
           </a:p>
         </p:txBody>
       </p:sp>
@@ -12039,6 +12027,543 @@
           <a:chExt cx="0" cy="0"/>
         </a:xfrm>
       </p:grpSpPr>
+      <p:sp>
+        <p:nvSpPr>
+          <p:cNvPr id="2" name="Title 1"/>
+          <p:cNvSpPr>
+            <a:spLocks noGrp="1"/>
+          </p:cNvSpPr>
+          <p:nvPr>
+            <p:ph type="title"/>
+          </p:nvPr>
+        </p:nvSpPr>
+        <p:spPr/>
+        <p:txBody>
+          <a:bodyPr/>
+          <a:lstStyle/>
+          <a:p>
+            <a:r>
+              <a:rPr lang="bg-BG" dirty="0" smtClean="0"/>
+              <a:t>Рекурсия</a:t>
+            </a:r>
+            <a:endParaRPr lang="en-US" dirty="0"/>
+          </a:p>
+        </p:txBody>
+      </p:sp>
+      <p:sp>
+        <p:nvSpPr>
+          <p:cNvPr id="3" name="Content Placeholder 2"/>
+          <p:cNvSpPr>
+            <a:spLocks noGrp="1"/>
+          </p:cNvSpPr>
+          <p:nvPr>
+            <p:ph sz="half" idx="1"/>
+          </p:nvPr>
+        </p:nvSpPr>
+        <p:spPr>
+          <a:xfrm>
+            <a:off x="1484312" y="2666999"/>
+            <a:ext cx="5914015" cy="3124201"/>
+          </a:xfrm>
+        </p:spPr>
+        <p:txBody>
+          <a:bodyPr>
+            <a:normAutofit fontScale="92500" lnSpcReduction="10000"/>
+          </a:bodyPr>
+          <a:lstStyle/>
+          <a:p>
+            <a:pPr algn="just"/>
+            <a:r>
+              <a:rPr lang="bg-BG" dirty="0" smtClean="0"/>
+              <a:t>Всяка фунцкия може да бъда извикана отново в своето тяло</a:t>
+            </a:r>
+          </a:p>
+          <a:p>
+            <a:pPr algn="just"/>
+            <a:r>
+              <a:rPr lang="bg-BG" dirty="0" smtClean="0"/>
+              <a:t>Рекурсията винаги трябва да има „дъно“, т.е. условие, при което се прекратява извикването на фунцкията в себе си</a:t>
+            </a:r>
+          </a:p>
+          <a:p>
+            <a:pPr algn="just"/>
+            <a:r>
+              <a:rPr lang="bg-BG" dirty="0" smtClean="0"/>
+              <a:t>Рекурсията е много удобен способ за обхождане на неизвестни колекции</a:t>
+            </a:r>
+            <a:endParaRPr lang="en-US" dirty="0" smtClean="0"/>
+          </a:p>
+          <a:p>
+            <a:pPr algn="just"/>
+            <a:r>
+              <a:rPr lang="bg-BG" dirty="0" smtClean="0"/>
+              <a:t>Всяка рекурския може да бъде заменена чрез итеративно решение</a:t>
+            </a:r>
+          </a:p>
+          <a:p>
+            <a:pPr lvl="1" algn="just"/>
+            <a:r>
+              <a:rPr lang="bg-BG" dirty="0" smtClean="0"/>
+              <a:t>В някои случаи рекурсията е много по-удобна от итерацията</a:t>
+            </a:r>
+          </a:p>
+        </p:txBody>
+      </p:sp>
+      <p:sp>
+        <p:nvSpPr>
+          <p:cNvPr id="5" name="Text Placeholder 3"/>
+          <p:cNvSpPr txBox="1">
+            <a:spLocks/>
+          </p:cNvSpPr>
+          <p:nvPr/>
+        </p:nvSpPr>
+        <p:spPr>
+          <a:xfrm>
+            <a:off x="7398327" y="2789382"/>
+            <a:ext cx="4268355" cy="2863277"/>
+          </a:xfrm>
+          <a:prstGeom prst="rect">
+            <a:avLst/>
+          </a:prstGeom>
+          <a:ln/>
+        </p:spPr>
+        <p:style>
+          <a:lnRef idx="0">
+            <a:schemeClr val="accent1"/>
+          </a:lnRef>
+          <a:fillRef idx="3">
+            <a:schemeClr val="accent1"/>
+          </a:fillRef>
+          <a:effectRef idx="3">
+            <a:schemeClr val="accent1"/>
+          </a:effectRef>
+          <a:fontRef idx="minor">
+            <a:schemeClr val="lt1"/>
+          </a:fontRef>
+        </p:style>
+        <p:txBody>
+          <a:bodyPr wrap="square">
+            <a:noAutofit/>
+          </a:bodyPr>
+          <a:lstStyle>
+            <a:lvl1pPr indent="0" fontAlgn="base">
+              <a:spcBef>
+                <a:spcPts val="0"/>
+              </a:spcBef>
+              <a:spcAft>
+                <a:spcPct val="0"/>
+              </a:spcAft>
+              <a:buClr>
+                <a:schemeClr val="accent5">
+                  <a:lumMod val="40000"/>
+                  <a:lumOff val="60000"/>
+                </a:schemeClr>
+              </a:buClr>
+              <a:buSzPct val="70000"/>
+              <a:buFont typeface="Wingdings 2" pitchFamily="18" charset="2"/>
+              <a:buNone/>
+              <a:defRPr lang="en-US" sz="2000" b="1" smtClean="0">
+                <a:solidFill>
+                  <a:srgbClr val="8CF4F2"/>
+                </a:solidFill>
+                <a:effectLst>
+                  <a:outerShdw blurRad="38100" dist="38100" dir="2700000" algn="tl">
+                    <a:srgbClr val="000000">
+                      <a:alpha val="43137"/>
+                    </a:srgbClr>
+                  </a:outerShdw>
+                </a:effectLst>
+                <a:latin typeface="Consolas" pitchFamily="49" charset="0"/>
+                <a:cs typeface="Consolas" pitchFamily="49" charset="0"/>
+              </a:defRPr>
+            </a:lvl1pPr>
+            <a:lvl2pPr marL="630238" indent="-273050" fontAlgn="base">
+              <a:spcBef>
+                <a:spcPct val="20000"/>
+              </a:spcBef>
+              <a:spcAft>
+                <a:spcPct val="0"/>
+              </a:spcAft>
+              <a:buClr>
+                <a:schemeClr val="accent2">
+                  <a:lumMod val="60000"/>
+                  <a:lumOff val="40000"/>
+                </a:schemeClr>
+              </a:buClr>
+              <a:buFont typeface="Wingdings 2" pitchFamily="18" charset="2"/>
+              <a:buChar char=""/>
+              <a:defRPr sz="3000" b="1">
+                <a:solidFill>
+                  <a:schemeClr val="tx1">
+                    <a:lumMod val="20000"/>
+                    <a:lumOff val="80000"/>
+                  </a:schemeClr>
+                </a:solidFill>
+                <a:effectLst>
+                  <a:outerShdw blurRad="38100" dist="38100" dir="2700000" algn="tl">
+                    <a:srgbClr val="000000">
+                      <a:alpha val="43137"/>
+                    </a:srgbClr>
+                  </a:outerShdw>
+                </a:effectLst>
+              </a:defRPr>
+            </a:lvl2pPr>
+            <a:lvl3pPr marL="922338" indent="-273050" fontAlgn="base">
+              <a:spcBef>
+                <a:spcPct val="20000"/>
+              </a:spcBef>
+              <a:spcAft>
+                <a:spcPct val="0"/>
+              </a:spcAft>
+              <a:buClr>
+                <a:schemeClr val="tx1">
+                  <a:lumMod val="50000"/>
+                </a:schemeClr>
+              </a:buClr>
+              <a:buFont typeface="Wingdings 2" pitchFamily="18" charset="2"/>
+              <a:buChar char=""/>
+              <a:defRPr sz="2800" b="1">
+                <a:solidFill>
+                  <a:schemeClr val="tx1">
+                    <a:lumMod val="20000"/>
+                    <a:lumOff val="80000"/>
+                  </a:schemeClr>
+                </a:solidFill>
+                <a:effectLst>
+                  <a:outerShdw blurRad="38100" dist="38100" dir="2700000" algn="tl">
+                    <a:srgbClr val="000000">
+                      <a:alpha val="43137"/>
+                    </a:srgbClr>
+                  </a:outerShdw>
+                </a:effectLst>
+              </a:defRPr>
+            </a:lvl3pPr>
+            <a:lvl4pPr marL="1187450" indent="-228600" fontAlgn="base">
+              <a:spcBef>
+                <a:spcPct val="20000"/>
+              </a:spcBef>
+              <a:spcAft>
+                <a:spcPct val="0"/>
+              </a:spcAft>
+              <a:buClr>
+                <a:srgbClr val="F8BD52"/>
+              </a:buClr>
+              <a:buFont typeface="Wingdings 2" pitchFamily="18" charset="2"/>
+              <a:buChar char=""/>
+              <a:defRPr sz="2600" b="1">
+                <a:solidFill>
+                  <a:schemeClr val="tx1">
+                    <a:lumMod val="20000"/>
+                    <a:lumOff val="80000"/>
+                  </a:schemeClr>
+                </a:solidFill>
+                <a:effectLst>
+                  <a:outerShdw blurRad="38100" dist="38100" dir="2700000" algn="tl">
+                    <a:srgbClr val="000000">
+                      <a:alpha val="43137"/>
+                    </a:srgbClr>
+                  </a:outerShdw>
+                </a:effectLst>
+              </a:defRPr>
+            </a:lvl4pPr>
+            <a:lvl5pPr marL="1425575" indent="-228600" fontAlgn="base">
+              <a:spcBef>
+                <a:spcPct val="20000"/>
+              </a:spcBef>
+              <a:spcAft>
+                <a:spcPct val="0"/>
+              </a:spcAft>
+              <a:buClr>
+                <a:srgbClr val="46A6BD"/>
+              </a:buClr>
+              <a:buFont typeface="Wingdings 2" pitchFamily="18" charset="2"/>
+              <a:buChar char=""/>
+              <a:defRPr sz="2400" b="1">
+                <a:solidFill>
+                  <a:schemeClr val="tx1">
+                    <a:lumMod val="20000"/>
+                    <a:lumOff val="80000"/>
+                  </a:schemeClr>
+                </a:solidFill>
+                <a:effectLst>
+                  <a:outerShdw blurRad="38100" dist="38100" dir="2700000" algn="tl">
+                    <a:srgbClr val="000000">
+                      <a:alpha val="43137"/>
+                    </a:srgbClr>
+                  </a:outerShdw>
+                </a:effectLst>
+              </a:defRPr>
+            </a:lvl5pPr>
+            <a:lvl6pPr marL="1673352" indent="-228600">
+              <a:spcBef>
+                <a:spcPct val="20000"/>
+              </a:spcBef>
+              <a:buClr>
+                <a:schemeClr val="accent6"/>
+              </a:buClr>
+              <a:buFont typeface="Wingdings 2"/>
+              <a:buChar char=""/>
+            </a:lvl6pPr>
+            <a:lvl7pPr marL="1911096" indent="-228600">
+              <a:spcBef>
+                <a:spcPct val="20000"/>
+              </a:spcBef>
+              <a:buClr>
+                <a:schemeClr val="tx2"/>
+              </a:buClr>
+              <a:buFont typeface="Wingdings 2"/>
+              <a:buChar char=""/>
+              <a:defRPr sz="1600"/>
+            </a:lvl7pPr>
+            <a:lvl8pPr marL="2121408" indent="-182880">
+              <a:spcBef>
+                <a:spcPct val="20000"/>
+              </a:spcBef>
+              <a:buClr>
+                <a:schemeClr val="tx2"/>
+              </a:buClr>
+              <a:buFont typeface="Wingdings 2"/>
+              <a:buChar char=""/>
+              <a:defRPr sz="1400"/>
+            </a:lvl8pPr>
+            <a:lvl9pPr marL="2322576" indent="-182880">
+              <a:spcBef>
+                <a:spcPct val="20000"/>
+              </a:spcBef>
+              <a:buClr>
+                <a:schemeClr val="tx2"/>
+              </a:buClr>
+              <a:buFont typeface="Wingdings 2"/>
+              <a:buChar char=""/>
+              <a:defRPr sz="1400"/>
+            </a:lvl9pPr>
+          </a:lstStyle>
+          <a:p>
+            <a:r>
+              <a:rPr lang="en-US" dirty="0" err="1" smtClean="0"/>
+              <a:t>var</a:t>
+            </a:r>
+            <a:r>
+              <a:rPr lang="en-US" dirty="0" smtClean="0"/>
+              <a:t> fact = function (</a:t>
+            </a:r>
+            <a:r>
+              <a:rPr lang="en-US" dirty="0"/>
+              <a:t>n) {</a:t>
+            </a:r>
+          </a:p>
+          <a:p>
+            <a:r>
+              <a:rPr lang="en-US" dirty="0" smtClean="0"/>
+              <a:t>  if </a:t>
+            </a:r>
+            <a:r>
+              <a:rPr lang="en-US" dirty="0"/>
+              <a:t>(n </a:t>
+            </a:r>
+            <a:r>
+              <a:rPr lang="en-US" dirty="0" smtClean="0"/>
+              <a:t>=== 0) </a:t>
+            </a:r>
+            <a:r>
+              <a:rPr lang="en-US" dirty="0"/>
+              <a:t>{</a:t>
+            </a:r>
+          </a:p>
+          <a:p>
+            <a:r>
+              <a:rPr lang="en-US" dirty="0"/>
+              <a:t>  </a:t>
+            </a:r>
+            <a:r>
+              <a:rPr lang="en-US" dirty="0" smtClean="0"/>
+              <a:t>  return </a:t>
+            </a:r>
+            <a:r>
+              <a:rPr lang="en-US" dirty="0"/>
+              <a:t>1;</a:t>
+            </a:r>
+          </a:p>
+          <a:p>
+            <a:r>
+              <a:rPr lang="en-US" dirty="0"/>
+              <a:t>  </a:t>
+            </a:r>
+            <a:r>
+              <a:rPr lang="en-US" dirty="0" smtClean="0"/>
+              <a:t>}</a:t>
+            </a:r>
+            <a:endParaRPr lang="bg-BG" dirty="0" smtClean="0"/>
+          </a:p>
+          <a:p>
+            <a:endParaRPr lang="en-US" dirty="0"/>
+          </a:p>
+          <a:p>
+            <a:r>
+              <a:rPr lang="en-US" dirty="0" smtClean="0"/>
+              <a:t>  return </a:t>
+            </a:r>
+            <a:r>
+              <a:rPr lang="en-US" dirty="0"/>
+              <a:t>n * fact </a:t>
+            </a:r>
+            <a:r>
+              <a:rPr lang="en-US" dirty="0" smtClean="0"/>
+              <a:t>(n </a:t>
+            </a:r>
+            <a:r>
+              <a:rPr lang="en-US" dirty="0"/>
+              <a:t>- 1);</a:t>
+            </a:r>
+          </a:p>
+          <a:p>
+            <a:r>
+              <a:rPr lang="en-US" dirty="0" smtClean="0"/>
+              <a:t>};</a:t>
+            </a:r>
+            <a:endParaRPr lang="bg-BG" dirty="0" smtClean="0"/>
+          </a:p>
+          <a:p>
+            <a:endParaRPr lang="en-US" dirty="0"/>
+          </a:p>
+          <a:p>
+            <a:r>
+              <a:rPr lang="en-US" dirty="0"/>
+              <a:t>c</a:t>
+            </a:r>
+            <a:r>
+              <a:rPr lang="en-US" dirty="0" smtClean="0"/>
+              <a:t>onsole.log(fact(5)); // 120</a:t>
+            </a:r>
+            <a:endParaRPr lang="bg-BG" dirty="0"/>
+          </a:p>
+        </p:txBody>
+      </p:sp>
+    </p:spTree>
+    <p:extLst>
+      <p:ext uri="{BB962C8B-B14F-4D97-AF65-F5344CB8AC3E}">
+        <p14:creationId xmlns:p14="http://schemas.microsoft.com/office/powerpoint/2010/main" val="1825140957"/>
+      </p:ext>
+    </p:extLst>
+  </p:cSld>
+  <p:clrMapOvr>
+    <a:masterClrMapping/>
+  </p:clrMapOvr>
+</p:sld>
+</file>
+
+<file path=ppt/slides/slide22.xml><?xml version="1.0" encoding="utf-8"?>
+<p:sld xmlns:a="http://schemas.openxmlformats.org/drawingml/2006/main" xmlns:r="http://schemas.openxmlformats.org/officeDocument/2006/relationships" xmlns:p="http://schemas.openxmlformats.org/presentationml/2006/main">
+  <p:cSld>
+    <p:spTree>
+      <p:nvGrpSpPr>
+        <p:cNvPr id="1" name=""/>
+        <p:cNvGrpSpPr/>
+        <p:nvPr/>
+      </p:nvGrpSpPr>
+      <p:grpSpPr>
+        <a:xfrm>
+          <a:off x="0" y="0"/>
+          <a:ext cx="0" cy="0"/>
+          <a:chOff x="0" y="0"/>
+          <a:chExt cx="0" cy="0"/>
+        </a:xfrm>
+      </p:grpSpPr>
+      <p:sp>
+        <p:nvSpPr>
+          <p:cNvPr id="6" name="Title 5"/>
+          <p:cNvSpPr>
+            <a:spLocks noGrp="1"/>
+          </p:cNvSpPr>
+          <p:nvPr>
+            <p:ph type="title"/>
+          </p:nvPr>
+        </p:nvSpPr>
+        <p:spPr>
+          <a:xfrm>
+            <a:off x="1484311" y="166256"/>
+            <a:ext cx="10018713" cy="2272144"/>
+          </a:xfrm>
+        </p:spPr>
+        <p:txBody>
+          <a:bodyPr/>
+          <a:lstStyle/>
+          <a:p>
+            <a:r>
+              <a:rPr lang="bg-BG" dirty="0" smtClean="0"/>
+              <a:t>Рекурсия</a:t>
+            </a:r>
+            <a:endParaRPr lang="en-US" dirty="0"/>
+          </a:p>
+        </p:txBody>
+      </p:sp>
+      <p:pic>
+        <p:nvPicPr>
+          <p:cNvPr id="7" name="Picture 6"/>
+          <p:cNvPicPr>
+            <a:picLocks noChangeAspect="1"/>
+          </p:cNvPicPr>
+          <p:nvPr/>
+        </p:nvPicPr>
+        <p:blipFill>
+          <a:blip r:embed="rId2">
+            <a:extLst>
+              <a:ext uri="{28A0092B-C50C-407E-A947-70E740481C1C}">
+                <a14:useLocalDpi xmlns:a14="http://schemas.microsoft.com/office/drawing/2010/main" val="0"/>
+              </a:ext>
+            </a:extLst>
+          </a:blip>
+          <a:stretch>
+            <a:fillRect/>
+          </a:stretch>
+        </p:blipFill>
+        <p:spPr>
+          <a:xfrm>
+            <a:off x="4112417" y="1943677"/>
+            <a:ext cx="4762500" cy="4762500"/>
+          </a:xfrm>
+          <a:prstGeom prst="rect">
+            <a:avLst/>
+          </a:prstGeom>
+        </p:spPr>
+      </p:pic>
+    </p:spTree>
+    <p:extLst>
+      <p:ext uri="{BB962C8B-B14F-4D97-AF65-F5344CB8AC3E}">
+        <p14:creationId xmlns:p14="http://schemas.microsoft.com/office/powerpoint/2010/main" val="129456427"/>
+      </p:ext>
+    </p:extLst>
+  </p:cSld>
+  <p:clrMapOvr>
+    <a:masterClrMapping/>
+  </p:clrMapOvr>
+  <p:timing>
+    <p:tnLst>
+      <p:par>
+        <p:cTn id="1" dur="indefinite" restart="never" nodeType="tmRoot"/>
+      </p:par>
+    </p:tnLst>
+  </p:timing>
+</p:sld>
+</file>
+
+<file path=ppt/slides/slide23.xml><?xml version="1.0" encoding="utf-8"?>
+<p:sld xmlns:a="http://schemas.openxmlformats.org/drawingml/2006/main" xmlns:r="http://schemas.openxmlformats.org/officeDocument/2006/relationships" xmlns:p="http://schemas.openxmlformats.org/presentationml/2006/main">
+  <p:cSld>
+    <p:spTree>
+      <p:nvGrpSpPr>
+        <p:cNvPr id="1" name=""/>
+        <p:cNvGrpSpPr/>
+        <p:nvPr/>
+      </p:nvGrpSpPr>
+      <p:grpSpPr>
+        <a:xfrm>
+          <a:off x="0" y="0"/>
+          <a:ext cx="0" cy="0"/>
+          <a:chOff x="0" y="0"/>
+          <a:chExt cx="0" cy="0"/>
+        </a:xfrm>
+      </p:grpSpPr>
       <p:pic>
         <p:nvPicPr>
           <p:cNvPr id="4" name="Content Placeholder 3"/>
@@ -12088,7 +12613,7 @@
 </p:sld>
 </file>
 
-<file path=ppt/slides/slide22.xml><?xml version="1.0" encoding="utf-8"?>
+<file path=ppt/slides/slide24.xml><?xml version="1.0" encoding="utf-8"?>
 <p:sld xmlns:a="http://schemas.openxmlformats.org/drawingml/2006/main" xmlns:r="http://schemas.openxmlformats.org/officeDocument/2006/relationships" xmlns:p="http://schemas.openxmlformats.org/presentationml/2006/main">
   <p:cSld>
     <p:spTree>

</xml_diff>